<commit_message>
Updated Power Points 1 and 4
</commit_message>
<xml_diff>
--- a/Intro to VR 1 - Using Github.pptx
+++ b/Intro to VR 1 - Using Github.pptx
@@ -11,6 +11,8 @@
     <p:sldId id="258" r:id="rId5"/>
     <p:sldId id="260" r:id="rId6"/>
     <p:sldId id="259" r:id="rId7"/>
+    <p:sldId id="261" r:id="rId8"/>
+    <p:sldId id="262" r:id="rId9"/>
   </p:sldIdLst>
   <p:sldSz cx="12192000" cy="6858000"/>
   <p:notesSz cx="6858000" cy="9144000"/>
@@ -109,6 +111,11 @@
       </a:defRPr>
     </a:lvl9pPr>
   </p:defaultTextStyle>
+  <p:extLst>
+    <p:ext uri="{EFAFB233-063F-42B5-8137-9DF3F51BA10A}">
+      <p15:sldGuideLst xmlns:p15="http://schemas.microsoft.com/office/powerpoint/2012/main"/>
+    </p:ext>
+  </p:extLst>
 </p:presentation>
 </file>
 
@@ -259,7 +266,7 @@
           <a:p>
             <a:fld id="{19153594-D386-4DFE-93A5-9D57663B0ABD}" type="datetimeFigureOut">
               <a:rPr lang="en-US" smtClean="0"/>
-              <a:t>2/11/2019</a:t>
+              <a:t>2/19/2019</a:t>
             </a:fld>
             <a:endParaRPr lang="en-US"/>
           </a:p>
@@ -457,7 +464,7 @@
           <a:p>
             <a:fld id="{19153594-D386-4DFE-93A5-9D57663B0ABD}" type="datetimeFigureOut">
               <a:rPr lang="en-US" smtClean="0"/>
-              <a:t>2/11/2019</a:t>
+              <a:t>2/19/2019</a:t>
             </a:fld>
             <a:endParaRPr lang="en-US"/>
           </a:p>
@@ -665,7 +672,7 @@
           <a:p>
             <a:fld id="{19153594-D386-4DFE-93A5-9D57663B0ABD}" type="datetimeFigureOut">
               <a:rPr lang="en-US" smtClean="0"/>
-              <a:t>2/11/2019</a:t>
+              <a:t>2/19/2019</a:t>
             </a:fld>
             <a:endParaRPr lang="en-US"/>
           </a:p>
@@ -964,7 +971,7 @@
           <a:p>
             <a:fld id="{2613C7C5-60D5-4A05-AD5C-79CC3C322401}" type="datetimeFigureOut">
               <a:rPr lang="en-US" smtClean="0"/>
-              <a:t>2/11/2019</a:t>
+              <a:t>2/19/2019</a:t>
             </a:fld>
             <a:endParaRPr lang="en-US"/>
           </a:p>
@@ -1176,7 +1183,7 @@
           <a:p>
             <a:fld id="{2613C7C5-60D5-4A05-AD5C-79CC3C322401}" type="datetimeFigureOut">
               <a:rPr lang="en-US" smtClean="0"/>
-              <a:t>2/11/2019</a:t>
+              <a:t>2/19/2019</a:t>
             </a:fld>
             <a:endParaRPr lang="en-US"/>
           </a:p>
@@ -1519,7 +1526,7 @@
           <a:p>
             <a:fld id="{2613C7C5-60D5-4A05-AD5C-79CC3C322401}" type="datetimeFigureOut">
               <a:rPr lang="en-US" smtClean="0"/>
-              <a:t>2/11/2019</a:t>
+              <a:t>2/19/2019</a:t>
             </a:fld>
             <a:endParaRPr lang="en-US"/>
           </a:p>
@@ -1794,7 +1801,7 @@
           <a:p>
             <a:fld id="{2613C7C5-60D5-4A05-AD5C-79CC3C322401}" type="datetimeFigureOut">
               <a:rPr lang="en-US" smtClean="0"/>
-              <a:t>2/11/2019</a:t>
+              <a:t>2/19/2019</a:t>
             </a:fld>
             <a:endParaRPr lang="en-US"/>
           </a:p>
@@ -2173,7 +2180,7 @@
           <a:p>
             <a:fld id="{2613C7C5-60D5-4A05-AD5C-79CC3C322401}" type="datetimeFigureOut">
               <a:rPr lang="en-US" smtClean="0"/>
-              <a:t>2/11/2019</a:t>
+              <a:t>2/19/2019</a:t>
             </a:fld>
             <a:endParaRPr lang="en-US"/>
           </a:p>
@@ -2291,7 +2298,7 @@
           <a:p>
             <a:fld id="{2613C7C5-60D5-4A05-AD5C-79CC3C322401}" type="datetimeFigureOut">
               <a:rPr lang="en-US" smtClean="0"/>
-              <a:t>2/11/2019</a:t>
+              <a:t>2/19/2019</a:t>
             </a:fld>
             <a:endParaRPr lang="en-US"/>
           </a:p>
@@ -2462,7 +2469,7 @@
           <a:p>
             <a:fld id="{2613C7C5-60D5-4A05-AD5C-79CC3C322401}" type="datetimeFigureOut">
               <a:rPr lang="en-US" smtClean="0"/>
-              <a:t>2/11/2019</a:t>
+              <a:t>2/19/2019</a:t>
             </a:fld>
             <a:endParaRPr lang="en-US"/>
           </a:p>
@@ -2816,7 +2823,7 @@
           <a:p>
             <a:fld id="{2613C7C5-60D5-4A05-AD5C-79CC3C322401}" type="datetimeFigureOut">
               <a:rPr lang="en-US" smtClean="0"/>
-              <a:t>2/11/2019</a:t>
+              <a:t>2/19/2019</a:t>
             </a:fld>
             <a:endParaRPr lang="en-US"/>
           </a:p>
@@ -3023,7 +3030,7 @@
           <a:p>
             <a:fld id="{19153594-D386-4DFE-93A5-9D57663B0ABD}" type="datetimeFigureOut">
               <a:rPr lang="en-US" smtClean="0"/>
-              <a:t>2/11/2019</a:t>
+              <a:t>2/19/2019</a:t>
             </a:fld>
             <a:endParaRPr lang="en-US"/>
           </a:p>
@@ -3396,7 +3403,7 @@
           <a:p>
             <a:fld id="{2613C7C5-60D5-4A05-AD5C-79CC3C322401}" type="datetimeFigureOut">
               <a:rPr lang="en-US" smtClean="0"/>
-              <a:t>2/11/2019</a:t>
+              <a:t>2/19/2019</a:t>
             </a:fld>
             <a:endParaRPr lang="en-US"/>
           </a:p>
@@ -3566,7 +3573,7 @@
           <a:p>
             <a:fld id="{2613C7C5-60D5-4A05-AD5C-79CC3C322401}" type="datetimeFigureOut">
               <a:rPr lang="en-US" smtClean="0"/>
-              <a:t>2/11/2019</a:t>
+              <a:t>2/19/2019</a:t>
             </a:fld>
             <a:endParaRPr lang="en-US"/>
           </a:p>
@@ -3822,7 +3829,7 @@
           <a:p>
             <a:fld id="{2613C7C5-60D5-4A05-AD5C-79CC3C322401}" type="datetimeFigureOut">
               <a:rPr lang="en-US" smtClean="0"/>
-              <a:t>2/11/2019</a:t>
+              <a:t>2/19/2019</a:t>
             </a:fld>
             <a:endParaRPr lang="en-US"/>
           </a:p>
@@ -4085,7 +4092,7 @@
           <a:p>
             <a:fld id="{19153594-D386-4DFE-93A5-9D57663B0ABD}" type="datetimeFigureOut">
               <a:rPr lang="en-US" smtClean="0"/>
-              <a:t>2/11/2019</a:t>
+              <a:t>2/19/2019</a:t>
             </a:fld>
             <a:endParaRPr lang="en-US"/>
           </a:p>
@@ -4350,7 +4357,7 @@
           <a:p>
             <a:fld id="{19153594-D386-4DFE-93A5-9D57663B0ABD}" type="datetimeFigureOut">
               <a:rPr lang="en-US" smtClean="0"/>
-              <a:t>2/11/2019</a:t>
+              <a:t>2/19/2019</a:t>
             </a:fld>
             <a:endParaRPr lang="en-US"/>
           </a:p>
@@ -4762,7 +4769,7 @@
           <a:p>
             <a:fld id="{19153594-D386-4DFE-93A5-9D57663B0ABD}" type="datetimeFigureOut">
               <a:rPr lang="en-US" smtClean="0"/>
-              <a:t>2/11/2019</a:t>
+              <a:t>2/19/2019</a:t>
             </a:fld>
             <a:endParaRPr lang="en-US"/>
           </a:p>
@@ -4903,7 +4910,7 @@
           <a:p>
             <a:fld id="{19153594-D386-4DFE-93A5-9D57663B0ABD}" type="datetimeFigureOut">
               <a:rPr lang="en-US" smtClean="0"/>
-              <a:t>2/11/2019</a:t>
+              <a:t>2/19/2019</a:t>
             </a:fld>
             <a:endParaRPr lang="en-US"/>
           </a:p>
@@ -5016,7 +5023,7 @@
           <a:p>
             <a:fld id="{19153594-D386-4DFE-93A5-9D57663B0ABD}" type="datetimeFigureOut">
               <a:rPr lang="en-US" smtClean="0"/>
-              <a:t>2/11/2019</a:t>
+              <a:t>2/19/2019</a:t>
             </a:fld>
             <a:endParaRPr lang="en-US"/>
           </a:p>
@@ -5327,7 +5334,7 @@
           <a:p>
             <a:fld id="{19153594-D386-4DFE-93A5-9D57663B0ABD}" type="datetimeFigureOut">
               <a:rPr lang="en-US" smtClean="0"/>
-              <a:t>2/11/2019</a:t>
+              <a:t>2/19/2019</a:t>
             </a:fld>
             <a:endParaRPr lang="en-US"/>
           </a:p>
@@ -5615,7 +5622,7 @@
           <a:p>
             <a:fld id="{19153594-D386-4DFE-93A5-9D57663B0ABD}" type="datetimeFigureOut">
               <a:rPr lang="en-US" smtClean="0"/>
-              <a:t>2/11/2019</a:t>
+              <a:t>2/19/2019</a:t>
             </a:fld>
             <a:endParaRPr lang="en-US"/>
           </a:p>
@@ -5856,7 +5863,7 @@
           <a:p>
             <a:fld id="{19153594-D386-4DFE-93A5-9D57663B0ABD}" type="datetimeFigureOut">
               <a:rPr lang="en-US" smtClean="0"/>
-              <a:t>2/11/2019</a:t>
+              <a:t>2/19/2019</a:t>
             </a:fld>
             <a:endParaRPr lang="en-US"/>
           </a:p>
@@ -6482,7 +6489,7 @@
           <a:p>
             <a:fld id="{2613C7C5-60D5-4A05-AD5C-79CC3C322401}" type="datetimeFigureOut">
               <a:rPr lang="en-US" smtClean="0"/>
-              <a:t>2/11/2019</a:t>
+              <a:t>2/19/2019</a:t>
             </a:fld>
             <a:endParaRPr lang="en-US"/>
           </a:p>
@@ -7504,6 +7511,47 @@
               <a:t> Familiarize yourself with basic git commands</a:t>
             </a:r>
           </a:p>
+          <a:p>
+            <a:pPr>
+              <a:buFont typeface="Arial" panose="020B0604020202020204" pitchFamily="34" charset="0"/>
+              <a:buChar char="•"/>
+            </a:pPr>
+            <a:r>
+              <a:rPr lang="en-US" dirty="0"/>
+              <a:t> </a:t>
+            </a:r>
+            <a:r>
+              <a:rPr lang="en-US" b="1" dirty="0"/>
+              <a:t>IMPORTANT NOTE</a:t>
+            </a:r>
+            <a:endParaRPr lang="en-US" dirty="0"/>
+          </a:p>
+          <a:p>
+            <a:pPr lvl="1">
+              <a:buFont typeface="Arial" panose="020B0604020202020204" pitchFamily="34" charset="0"/>
+              <a:buChar char="•"/>
+            </a:pPr>
+            <a:r>
+              <a:rPr lang="en-US" dirty="0"/>
+              <a:t>git-</a:t>
+            </a:r>
+            <a:r>
+              <a:rPr lang="en-US" dirty="0" err="1"/>
+              <a:t>lfs</a:t>
+            </a:r>
+            <a:r>
+              <a:rPr lang="en-US" dirty="0"/>
+              <a:t> in terminal is free to use, but keep in mind the </a:t>
+            </a:r>
+            <a:r>
+              <a:rPr lang="en-US" dirty="0" err="1"/>
+              <a:t>Github</a:t>
+            </a:r>
+            <a:r>
+              <a:rPr lang="en-US" dirty="0"/>
+              <a:t> repo max capacity is 1GB standard</a:t>
+            </a:r>
+          </a:p>
         </p:txBody>
       </p:sp>
     </p:spTree>
@@ -7947,6 +7995,658 @@
     <p:extLst>
       <p:ext uri="{BB962C8B-B14F-4D97-AF65-F5344CB8AC3E}">
         <p14:creationId xmlns:p14="http://schemas.microsoft.com/office/powerpoint/2010/main" val="1135038177"/>
+      </p:ext>
+    </p:extLst>
+  </p:cSld>
+  <p:clrMapOvr>
+    <a:masterClrMapping/>
+  </p:clrMapOvr>
+</p:sld>
+</file>
+
+<file path=ppt/slides/slide6.xml><?xml version="1.0" encoding="utf-8"?>
+<p:sld xmlns:a="http://schemas.openxmlformats.org/drawingml/2006/main" xmlns:r="http://schemas.openxmlformats.org/officeDocument/2006/relationships" xmlns:p="http://schemas.openxmlformats.org/presentationml/2006/main">
+  <p:cSld>
+    <p:spTree>
+      <p:nvGrpSpPr>
+        <p:cNvPr id="1" name=""/>
+        <p:cNvGrpSpPr/>
+        <p:nvPr/>
+      </p:nvGrpSpPr>
+      <p:grpSpPr>
+        <a:xfrm>
+          <a:off x="0" y="0"/>
+          <a:ext cx="0" cy="0"/>
+          <a:chOff x="0" y="0"/>
+          <a:chExt cx="0" cy="0"/>
+        </a:xfrm>
+      </p:grpSpPr>
+      <p:sp>
+        <p:nvSpPr>
+          <p:cNvPr id="2" name="Title 1">
+            <a:extLst>
+              <a:ext uri="{FF2B5EF4-FFF2-40B4-BE49-F238E27FC236}">
+                <a16:creationId xmlns:a16="http://schemas.microsoft.com/office/drawing/2014/main" id="{BF7C0FC5-AFA7-43BA-8C87-9613E0CEA1AE}"/>
+              </a:ext>
+            </a:extLst>
+          </p:cNvPr>
+          <p:cNvSpPr>
+            <a:spLocks noGrp="1"/>
+          </p:cNvSpPr>
+          <p:nvPr>
+            <p:ph type="title"/>
+          </p:nvPr>
+        </p:nvSpPr>
+        <p:spPr/>
+        <p:txBody>
+          <a:bodyPr/>
+          <a:lstStyle/>
+          <a:p>
+            <a:r>
+              <a:rPr lang="en-US" dirty="0"/>
+              <a:t>Creating a GitHub Repo</a:t>
+            </a:r>
+          </a:p>
+        </p:txBody>
+      </p:sp>
+      <p:sp>
+        <p:nvSpPr>
+          <p:cNvPr id="3" name="Content Placeholder 2">
+            <a:extLst>
+              <a:ext uri="{FF2B5EF4-FFF2-40B4-BE49-F238E27FC236}">
+                <a16:creationId xmlns:a16="http://schemas.microsoft.com/office/drawing/2014/main" id="{7AC6C632-058F-4F62-9D50-4343523CA207}"/>
+              </a:ext>
+            </a:extLst>
+          </p:cNvPr>
+          <p:cNvSpPr>
+            <a:spLocks noGrp="1"/>
+          </p:cNvSpPr>
+          <p:nvPr>
+            <p:ph idx="1"/>
+          </p:nvPr>
+        </p:nvSpPr>
+        <p:spPr>
+          <a:xfrm>
+            <a:off x="1097280" y="1845734"/>
+            <a:ext cx="5277368" cy="3282509"/>
+          </a:xfrm>
+        </p:spPr>
+        <p:txBody>
+          <a:bodyPr/>
+          <a:lstStyle/>
+          <a:p>
+            <a:pPr>
+              <a:buFont typeface="Arial" panose="020B0604020202020204" pitchFamily="34" charset="0"/>
+              <a:buChar char="•"/>
+            </a:pPr>
+            <a:r>
+              <a:rPr lang="en-US" dirty="0"/>
+              <a:t> Start by creating an empty repository on </a:t>
+            </a:r>
+            <a:r>
+              <a:rPr lang="en-US" dirty="0" err="1"/>
+              <a:t>github</a:t>
+            </a:r>
+            <a:endParaRPr lang="en-US" dirty="0"/>
+          </a:p>
+          <a:p>
+            <a:pPr>
+              <a:buFont typeface="Arial" panose="020B0604020202020204" pitchFamily="34" charset="0"/>
+              <a:buChar char="•"/>
+            </a:pPr>
+            <a:r>
+              <a:rPr lang="en-US" dirty="0"/>
+              <a:t> Once created, copy the link to your repository</a:t>
+            </a:r>
+          </a:p>
+          <a:p>
+            <a:pPr>
+              <a:buFont typeface="Arial" panose="020B0604020202020204" pitchFamily="34" charset="0"/>
+              <a:buChar char="•"/>
+            </a:pPr>
+            <a:r>
+              <a:rPr lang="en-US" dirty="0"/>
+              <a:t> There will be a number of commands needed to be ran in your local repository</a:t>
+            </a:r>
+          </a:p>
+        </p:txBody>
+      </p:sp>
+      <p:pic>
+        <p:nvPicPr>
+          <p:cNvPr id="4" name="Picture 3">
+            <a:extLst>
+              <a:ext uri="{FF2B5EF4-FFF2-40B4-BE49-F238E27FC236}">
+                <a16:creationId xmlns:a16="http://schemas.microsoft.com/office/drawing/2014/main" id="{3667516C-58ED-49DB-BCAC-FDA97C6A53B8}"/>
+              </a:ext>
+            </a:extLst>
+          </p:cNvPr>
+          <p:cNvPicPr>
+            <a:picLocks noChangeAspect="1"/>
+          </p:cNvPicPr>
+          <p:nvPr/>
+        </p:nvPicPr>
+        <p:blipFill rotWithShape="1">
+          <a:blip r:embed="rId2"/>
+          <a:srcRect l="35740" t="9362" r="19495" b="21088"/>
+          <a:stretch/>
+        </p:blipFill>
+        <p:spPr>
+          <a:xfrm>
+            <a:off x="6374649" y="1845734"/>
+            <a:ext cx="3756048" cy="3282509"/>
+          </a:xfrm>
+          <a:prstGeom prst="rect">
+            <a:avLst/>
+          </a:prstGeom>
+        </p:spPr>
+      </p:pic>
+      <p:pic>
+        <p:nvPicPr>
+          <p:cNvPr id="5" name="Picture 4">
+            <a:extLst>
+              <a:ext uri="{FF2B5EF4-FFF2-40B4-BE49-F238E27FC236}">
+                <a16:creationId xmlns:a16="http://schemas.microsoft.com/office/drawing/2014/main" id="{B651879A-B092-4B5C-8128-941E61C7BBC5}"/>
+              </a:ext>
+            </a:extLst>
+          </p:cNvPr>
+          <p:cNvPicPr>
+            <a:picLocks noChangeAspect="1"/>
+          </p:cNvPicPr>
+          <p:nvPr/>
+        </p:nvPicPr>
+        <p:blipFill rotWithShape="1">
+          <a:blip r:embed="rId3"/>
+          <a:srcRect l="27934" t="32057" r="8500" b="54694"/>
+          <a:stretch/>
+        </p:blipFill>
+        <p:spPr>
+          <a:xfrm>
+            <a:off x="1219198" y="5128243"/>
+            <a:ext cx="7750007" cy="908644"/>
+          </a:xfrm>
+          <a:prstGeom prst="rect">
+            <a:avLst/>
+          </a:prstGeom>
+        </p:spPr>
+      </p:pic>
+    </p:spTree>
+    <p:extLst>
+      <p:ext uri="{BB962C8B-B14F-4D97-AF65-F5344CB8AC3E}">
+        <p14:creationId xmlns:p14="http://schemas.microsoft.com/office/powerpoint/2010/main" val="1516642105"/>
+      </p:ext>
+    </p:extLst>
+  </p:cSld>
+  <p:clrMapOvr>
+    <a:masterClrMapping/>
+  </p:clrMapOvr>
+</p:sld>
+</file>
+
+<file path=ppt/slides/slide7.xml><?xml version="1.0" encoding="utf-8"?>
+<p:sld xmlns:a="http://schemas.openxmlformats.org/drawingml/2006/main" xmlns:r="http://schemas.openxmlformats.org/officeDocument/2006/relationships" xmlns:p="http://schemas.openxmlformats.org/presentationml/2006/main">
+  <p:cSld>
+    <p:bg>
+      <p:bgPr>
+        <a:solidFill>
+          <a:schemeClr val="bg1"/>
+        </a:solidFill>
+        <a:effectLst/>
+      </p:bgPr>
+    </p:bg>
+    <p:spTree>
+      <p:nvGrpSpPr>
+        <p:cNvPr id="1" name=""/>
+        <p:cNvGrpSpPr/>
+        <p:nvPr/>
+      </p:nvGrpSpPr>
+      <p:grpSpPr>
+        <a:xfrm>
+          <a:off x="0" y="0"/>
+          <a:ext cx="0" cy="0"/>
+          <a:chOff x="0" y="0"/>
+          <a:chExt cx="0" cy="0"/>
+        </a:xfrm>
+      </p:grpSpPr>
+      <p:sp useBgFill="1">
+        <p:nvSpPr>
+          <p:cNvPr id="9" name="Rectangle 8">
+            <a:extLst>
+              <a:ext uri="{FF2B5EF4-FFF2-40B4-BE49-F238E27FC236}">
+                <a16:creationId xmlns:a16="http://schemas.microsoft.com/office/drawing/2014/main" id="{52ABB703-2B0E-4C3B-B4A2-F3973548E561}"/>
+              </a:ext>
+              <a:ext uri="{C183D7F6-B498-43B3-948B-1728B52AA6E4}">
+                <adec:decorative xmlns:adec="http://schemas.microsoft.com/office/drawing/2017/decorative" val="1"/>
+              </a:ext>
+            </a:extLst>
+          </p:cNvPr>
+          <p:cNvSpPr>
+            <a:spLocks noGrp="1" noRot="1" noChangeAspect="1" noMove="1" noResize="1" noEditPoints="1" noAdjustHandles="1" noChangeArrowheads="1" noChangeShapeType="1" noTextEdit="1"/>
+          </p:cNvSpPr>
+          <p:nvPr>
+            <p:extLst>
+              <p:ext uri="{386F3935-93C4-4BCD-93E2-E3B085C9AB24}">
+                <p16:designElem xmlns:p16="http://schemas.microsoft.com/office/powerpoint/2015/main" val="1"/>
+              </p:ext>
+            </p:extLst>
+          </p:nvPr>
+        </p:nvSpPr>
+        <p:spPr>
+          <a:xfrm>
+            <a:off x="0" y="0"/>
+            <a:ext cx="12192001" cy="6334316"/>
+          </a:xfrm>
+          <a:prstGeom prst="rect">
+            <a:avLst/>
+          </a:prstGeom>
+          <a:ln>
+            <a:noFill/>
+          </a:ln>
+        </p:spPr>
+        <p:style>
+          <a:lnRef idx="2">
+            <a:schemeClr val="accent1">
+              <a:shade val="50000"/>
+            </a:schemeClr>
+          </a:lnRef>
+          <a:fillRef idx="1">
+            <a:schemeClr val="accent1"/>
+          </a:fillRef>
+          <a:effectRef idx="0">
+            <a:schemeClr val="accent1"/>
+          </a:effectRef>
+          <a:fontRef idx="minor">
+            <a:schemeClr val="lt1"/>
+          </a:fontRef>
+        </p:style>
+        <p:txBody>
+          <a:bodyPr rtlCol="0" anchor="ctr"/>
+          <a:lstStyle/>
+          <a:p>
+            <a:pPr algn="ctr"/>
+            <a:endParaRPr lang="en-US"/>
+          </a:p>
+        </p:txBody>
+      </p:sp>
+      <p:sp>
+        <p:nvSpPr>
+          <p:cNvPr id="2" name="Title 1">
+            <a:extLst>
+              <a:ext uri="{FF2B5EF4-FFF2-40B4-BE49-F238E27FC236}">
+                <a16:creationId xmlns:a16="http://schemas.microsoft.com/office/drawing/2014/main" id="{F1A9DD6A-EC66-4982-ADE0-0C617B29E463}"/>
+              </a:ext>
+            </a:extLst>
+          </p:cNvPr>
+          <p:cNvSpPr>
+            <a:spLocks noGrp="1"/>
+          </p:cNvSpPr>
+          <p:nvPr>
+            <p:ph type="title"/>
+          </p:nvPr>
+        </p:nvSpPr>
+        <p:spPr>
+          <a:xfrm>
+            <a:off x="6411685" y="634946"/>
+            <a:ext cx="5127171" cy="1450757"/>
+          </a:xfrm>
+        </p:spPr>
+        <p:txBody>
+          <a:bodyPr>
+            <a:normAutofit/>
+          </a:bodyPr>
+          <a:lstStyle/>
+          <a:p>
+            <a:r>
+              <a:rPr lang="en-US" dirty="0"/>
+              <a:t>Git – In Terminal</a:t>
+            </a:r>
+          </a:p>
+        </p:txBody>
+      </p:sp>
+      <p:pic>
+        <p:nvPicPr>
+          <p:cNvPr id="4" name="Picture 3">
+            <a:extLst>
+              <a:ext uri="{FF2B5EF4-FFF2-40B4-BE49-F238E27FC236}">
+                <a16:creationId xmlns:a16="http://schemas.microsoft.com/office/drawing/2014/main" id="{0D52D804-97A6-4D2A-B774-C8BA3E39977B}"/>
+              </a:ext>
+            </a:extLst>
+          </p:cNvPr>
+          <p:cNvPicPr>
+            <a:picLocks noChangeAspect="1"/>
+          </p:cNvPicPr>
+          <p:nvPr/>
+        </p:nvPicPr>
+        <p:blipFill rotWithShape="1">
+          <a:blip r:embed="rId2"/>
+          <a:srcRect l="12551" t="15603" r="50000" b="18661"/>
+          <a:stretch/>
+        </p:blipFill>
+        <p:spPr>
+          <a:xfrm>
+            <a:off x="309437" y="225228"/>
+            <a:ext cx="5723883" cy="5651691"/>
+          </a:xfrm>
+          <a:prstGeom prst="rect">
+            <a:avLst/>
+          </a:prstGeom>
+        </p:spPr>
+      </p:pic>
+      <p:cxnSp>
+        <p:nvCxnSpPr>
+          <p:cNvPr id="11" name="Straight Connector 10">
+            <a:extLst>
+              <a:ext uri="{FF2B5EF4-FFF2-40B4-BE49-F238E27FC236}">
+                <a16:creationId xmlns:a16="http://schemas.microsoft.com/office/drawing/2014/main" id="{9C21570E-E159-49A6-9891-FA397B7A92D3}"/>
+              </a:ext>
+              <a:ext uri="{C183D7F6-B498-43B3-948B-1728B52AA6E4}">
+                <adec:decorative xmlns:adec="http://schemas.microsoft.com/office/drawing/2017/decorative" val="1"/>
+              </a:ext>
+            </a:extLst>
+          </p:cNvPr>
+          <p:cNvCxnSpPr>
+            <a:cxnSpLocks noGrp="1" noRot="1" noChangeAspect="1" noMove="1" noResize="1" noEditPoints="1" noAdjustHandles="1" noChangeArrowheads="1" noChangeShapeType="1"/>
+          </p:cNvCxnSpPr>
+          <p:nvPr>
+            <p:extLst>
+              <p:ext uri="{386F3935-93C4-4BCD-93E2-E3B085C9AB24}">
+                <p16:designElem xmlns:p16="http://schemas.microsoft.com/office/powerpoint/2015/main" val="1"/>
+              </p:ext>
+            </p:extLst>
+          </p:nvPr>
+        </p:nvCxnSpPr>
+        <p:spPr>
+          <a:xfrm>
+            <a:off x="6411684" y="2086188"/>
+            <a:ext cx="4748808" cy="0"/>
+          </a:xfrm>
+          <a:prstGeom prst="line">
+            <a:avLst/>
+          </a:prstGeom>
+          <a:ln w="6350">
+            <a:solidFill>
+              <a:schemeClr val="tx1">
+                <a:lumMod val="50000"/>
+                <a:lumOff val="50000"/>
+                <a:alpha val="90000"/>
+              </a:schemeClr>
+            </a:solidFill>
+          </a:ln>
+        </p:spPr>
+        <p:style>
+          <a:lnRef idx="1">
+            <a:schemeClr val="accent1"/>
+          </a:lnRef>
+          <a:fillRef idx="0">
+            <a:schemeClr val="accent1"/>
+          </a:fillRef>
+          <a:effectRef idx="0">
+            <a:schemeClr val="accent1"/>
+          </a:effectRef>
+          <a:fontRef idx="minor">
+            <a:schemeClr val="tx1"/>
+          </a:fontRef>
+        </p:style>
+      </p:cxnSp>
+      <p:sp>
+        <p:nvSpPr>
+          <p:cNvPr id="3" name="Content Placeholder 2">
+            <a:extLst>
+              <a:ext uri="{FF2B5EF4-FFF2-40B4-BE49-F238E27FC236}">
+                <a16:creationId xmlns:a16="http://schemas.microsoft.com/office/drawing/2014/main" id="{57919E9D-41DD-4DEE-AC35-A37005A04A64}"/>
+              </a:ext>
+            </a:extLst>
+          </p:cNvPr>
+          <p:cNvSpPr>
+            <a:spLocks noGrp="1"/>
+          </p:cNvSpPr>
+          <p:nvPr>
+            <p:ph idx="1"/>
+          </p:nvPr>
+        </p:nvSpPr>
+        <p:spPr>
+          <a:xfrm>
+            <a:off x="6411684" y="2198914"/>
+            <a:ext cx="5127172" cy="3670180"/>
+          </a:xfrm>
+        </p:spPr>
+        <p:txBody>
+          <a:bodyPr>
+            <a:normAutofit/>
+          </a:bodyPr>
+          <a:lstStyle/>
+          <a:p>
+            <a:r>
+              <a:rPr lang="en-US" dirty="0"/>
+              <a:t>Run the following commands in your </a:t>
+            </a:r>
+            <a:r>
+              <a:rPr lang="en-US"/>
+              <a:t>repository:</a:t>
+            </a:r>
+            <a:endParaRPr lang="en-US" dirty="0"/>
+          </a:p>
+          <a:p>
+            <a:pPr>
+              <a:spcBef>
+                <a:spcPts val="0"/>
+              </a:spcBef>
+            </a:pPr>
+            <a:r>
+              <a:rPr lang="en-US" i="1" dirty="0"/>
+              <a:t>git </a:t>
+            </a:r>
+            <a:r>
+              <a:rPr lang="en-US" i="1" dirty="0" err="1"/>
+              <a:t>lfs</a:t>
+            </a:r>
+            <a:r>
+              <a:rPr lang="en-US" i="1" dirty="0"/>
+              <a:t> install</a:t>
+            </a:r>
+          </a:p>
+          <a:p>
+            <a:pPr>
+              <a:spcBef>
+                <a:spcPts val="0"/>
+              </a:spcBef>
+            </a:pPr>
+            <a:r>
+              <a:rPr lang="en-US" i="1" dirty="0"/>
+              <a:t>git </a:t>
+            </a:r>
+            <a:r>
+              <a:rPr lang="en-US" i="1" dirty="0" err="1"/>
+              <a:t>init</a:t>
+            </a:r>
+            <a:endParaRPr lang="en-US" i="1" dirty="0"/>
+          </a:p>
+          <a:p>
+            <a:pPr>
+              <a:spcBef>
+                <a:spcPts val="0"/>
+              </a:spcBef>
+            </a:pPr>
+            <a:r>
+              <a:rPr lang="en-US" i="1" dirty="0"/>
+              <a:t>git add .</a:t>
+            </a:r>
+          </a:p>
+          <a:p>
+            <a:pPr>
+              <a:spcBef>
+                <a:spcPts val="0"/>
+              </a:spcBef>
+            </a:pPr>
+            <a:r>
+              <a:rPr lang="en-US" i="1" dirty="0"/>
+              <a:t>git commit –m “First Commit”</a:t>
+            </a:r>
+          </a:p>
+          <a:p>
+            <a:pPr>
+              <a:spcBef>
+                <a:spcPts val="0"/>
+              </a:spcBef>
+            </a:pPr>
+            <a:r>
+              <a:rPr lang="en-US" i="1" dirty="0"/>
+              <a:t>git remote add origin [</a:t>
+            </a:r>
+            <a:r>
+              <a:rPr lang="en-US" i="1" dirty="0" err="1"/>
+              <a:t>url</a:t>
+            </a:r>
+            <a:r>
+              <a:rPr lang="en-US" i="1" dirty="0"/>
+              <a:t>]</a:t>
+            </a:r>
+          </a:p>
+          <a:p>
+            <a:pPr>
+              <a:spcBef>
+                <a:spcPts val="0"/>
+              </a:spcBef>
+            </a:pPr>
+            <a:r>
+              <a:rPr lang="en-US" i="1" dirty="0"/>
+              <a:t>git remote –v</a:t>
+            </a:r>
+          </a:p>
+          <a:p>
+            <a:pPr>
+              <a:spcBef>
+                <a:spcPts val="0"/>
+              </a:spcBef>
+            </a:pPr>
+            <a:r>
+              <a:rPr lang="en-US" i="1" dirty="0"/>
+              <a:t>git push origin master</a:t>
+            </a:r>
+          </a:p>
+          <a:p>
+            <a:pPr>
+              <a:spcBef>
+                <a:spcPts val="0"/>
+              </a:spcBef>
+            </a:pPr>
+            <a:endParaRPr lang="en-US" i="1" dirty="0"/>
+          </a:p>
+        </p:txBody>
+      </p:sp>
+      <p:sp>
+        <p:nvSpPr>
+          <p:cNvPr id="13" name="Rectangle 12">
+            <a:extLst>
+              <a:ext uri="{FF2B5EF4-FFF2-40B4-BE49-F238E27FC236}">
+                <a16:creationId xmlns:a16="http://schemas.microsoft.com/office/drawing/2014/main" id="{E95DA498-D9A2-4DA9-B9DA-B3776E08CF7E}"/>
+              </a:ext>
+              <a:ext uri="{C183D7F6-B498-43B3-948B-1728B52AA6E4}">
+                <adec:decorative xmlns:adec="http://schemas.microsoft.com/office/drawing/2017/decorative" val="1"/>
+              </a:ext>
+            </a:extLst>
+          </p:cNvPr>
+          <p:cNvSpPr>
+            <a:spLocks noGrp="1" noRot="1" noChangeAspect="1" noMove="1" noResize="1" noEditPoints="1" noAdjustHandles="1" noChangeArrowheads="1" noChangeShapeType="1" noTextEdit="1"/>
+          </p:cNvSpPr>
+          <p:nvPr>
+            <p:extLst>
+              <p:ext uri="{386F3935-93C4-4BCD-93E2-E3B085C9AB24}">
+                <p16:designElem xmlns:p16="http://schemas.microsoft.com/office/powerpoint/2015/main" val="1"/>
+              </p:ext>
+            </p:extLst>
+          </p:nvPr>
+        </p:nvSpPr>
+        <p:spPr>
+          <a:xfrm>
+            <a:off x="15" y="6334316"/>
+            <a:ext cx="12191985" cy="66484"/>
+          </a:xfrm>
+          <a:prstGeom prst="rect">
+            <a:avLst/>
+          </a:prstGeom>
+          <a:solidFill>
+            <a:schemeClr val="accent1"/>
+          </a:solidFill>
+          <a:ln>
+            <a:noFill/>
+          </a:ln>
+        </p:spPr>
+        <p:style>
+          <a:lnRef idx="2">
+            <a:schemeClr val="accent1">
+              <a:shade val="50000"/>
+            </a:schemeClr>
+          </a:lnRef>
+          <a:fillRef idx="1">
+            <a:schemeClr val="accent1"/>
+          </a:fillRef>
+          <a:effectRef idx="0">
+            <a:schemeClr val="accent1"/>
+          </a:effectRef>
+          <a:fontRef idx="minor">
+            <a:schemeClr val="lt1"/>
+          </a:fontRef>
+        </p:style>
+      </p:sp>
+      <p:sp>
+        <p:nvSpPr>
+          <p:cNvPr id="15" name="Rectangle 14">
+            <a:extLst>
+              <a:ext uri="{FF2B5EF4-FFF2-40B4-BE49-F238E27FC236}">
+                <a16:creationId xmlns:a16="http://schemas.microsoft.com/office/drawing/2014/main" id="{82A73093-4B9D-420D-B17E-52293703A1D4}"/>
+              </a:ext>
+              <a:ext uri="{C183D7F6-B498-43B3-948B-1728B52AA6E4}">
+                <adec:decorative xmlns:adec="http://schemas.microsoft.com/office/drawing/2017/decorative" val="1"/>
+              </a:ext>
+            </a:extLst>
+          </p:cNvPr>
+          <p:cNvSpPr>
+            <a:spLocks noGrp="1" noRot="1" noChangeAspect="1" noMove="1" noResize="1" noEditPoints="1" noAdjustHandles="1" noChangeArrowheads="1" noChangeShapeType="1" noTextEdit="1"/>
+          </p:cNvSpPr>
+          <p:nvPr>
+            <p:extLst>
+              <p:ext uri="{386F3935-93C4-4BCD-93E2-E3B085C9AB24}">
+                <p16:designElem xmlns:p16="http://schemas.microsoft.com/office/powerpoint/2015/main" val="1"/>
+              </p:ext>
+            </p:extLst>
+          </p:nvPr>
+        </p:nvSpPr>
+        <p:spPr>
+          <a:xfrm>
+            <a:off x="1" y="6400800"/>
+            <a:ext cx="12192000" cy="457200"/>
+          </a:xfrm>
+          <a:prstGeom prst="rect">
+            <a:avLst/>
+          </a:prstGeom>
+          <a:solidFill>
+            <a:schemeClr val="accent2"/>
+          </a:solidFill>
+          <a:ln>
+            <a:noFill/>
+          </a:ln>
+        </p:spPr>
+        <p:style>
+          <a:lnRef idx="2">
+            <a:schemeClr val="accent1">
+              <a:shade val="50000"/>
+            </a:schemeClr>
+          </a:lnRef>
+          <a:fillRef idx="1">
+            <a:schemeClr val="accent1"/>
+          </a:fillRef>
+          <a:effectRef idx="0">
+            <a:schemeClr val="accent1"/>
+          </a:effectRef>
+          <a:fontRef idx="minor">
+            <a:schemeClr val="lt1"/>
+          </a:fontRef>
+        </p:style>
+      </p:sp>
+    </p:spTree>
+    <p:extLst>
+      <p:ext uri="{BB962C8B-B14F-4D97-AF65-F5344CB8AC3E}">
+        <p14:creationId xmlns:p14="http://schemas.microsoft.com/office/powerpoint/2010/main" val="2012280941"/>
       </p:ext>
     </p:extLst>
   </p:cSld>

</xml_diff>